<commit_message>
Better readability for a slide
</commit_message>
<xml_diff>
--- a/Testing WebApi.pptx
+++ b/Testing WebApi.pptx
@@ -8055,15 +8055,71 @@
             <a:lstStyle/>
             <a:p>
               <a:pPr algn="ctr"/>
-              <a:r>
-                <a:rPr lang="en-US" sz="3200" dirty="0" err="1" smtClean="0"/>
-                <a:t>DelegatingHandler</a:t>
-              </a:r>
               <a:endParaRPr lang="en-US" sz="3200" dirty="0"/>
             </a:p>
           </p:txBody>
         </p:sp>
       </p:grpSp>
+      <p:sp>
+        <p:nvSpPr>
+          <p:cNvPr id="7" name="TextBox 6"/>
+          <p:cNvSpPr txBox="1"/>
+          <p:nvPr/>
+        </p:nvSpPr>
+        <p:spPr>
+          <a:xfrm>
+            <a:off x="4376786" y="3201441"/>
+            <a:ext cx="3564822" cy="646331"/>
+          </a:xfrm>
+          <a:prstGeom prst="rect">
+            <a:avLst/>
+          </a:prstGeom>
+          <a:noFill/>
+        </p:spPr>
+        <p:txBody>
+          <a:bodyPr wrap="none" rtlCol="0">
+            <a:spAutoFit/>
+          </a:bodyPr>
+          <a:lstStyle/>
+          <a:p>
+            <a:r>
+              <a:rPr lang="en-US" sz="3600" dirty="0" err="1" smtClean="0"/>
+              <a:t>HttpConfiguration</a:t>
+            </a:r>
+            <a:endParaRPr lang="en-US" sz="3600" dirty="0"/>
+          </a:p>
+        </p:txBody>
+      </p:sp>
+      <p:sp>
+        <p:nvSpPr>
+          <p:cNvPr id="8" name="TextBox 7"/>
+          <p:cNvSpPr txBox="1"/>
+          <p:nvPr/>
+        </p:nvSpPr>
+        <p:spPr>
+          <a:xfrm>
+            <a:off x="4848421" y="3972605"/>
+            <a:ext cx="2510046" cy="461665"/>
+          </a:xfrm>
+          <a:prstGeom prst="rect">
+            <a:avLst/>
+          </a:prstGeom>
+          <a:noFill/>
+        </p:spPr>
+        <p:txBody>
+          <a:bodyPr wrap="none" rtlCol="0">
+            <a:spAutoFit/>
+          </a:bodyPr>
+          <a:lstStyle/>
+          <a:p>
+            <a:r>
+              <a:rPr lang="en-US" sz="2400" dirty="0" err="1" smtClean="0"/>
+              <a:t>DelegatingHandler</a:t>
+            </a:r>
+            <a:endParaRPr lang="en-US" sz="2400" dirty="0"/>
+          </a:p>
+        </p:txBody>
+      </p:sp>
     </p:spTree>
     <p:extLst>
       <p:ext uri="{BB962C8B-B14F-4D97-AF65-F5344CB8AC3E}">

</xml_diff>